<commit_message>
Conv free semantic segmentation model presentation done
</commit_message>
<xml_diff>
--- a/presentations/Convolution-Free Medical Image Segmentation using Transformers.pptx
+++ b/presentations/Convolution-Free Medical Image Segmentation using Transformers.pptx
@@ -9,6 +9,14 @@
     <p:sldId id="257" r:id="rId3"/>
     <p:sldId id="259" r:id="rId4"/>
     <p:sldId id="260" r:id="rId5"/>
+    <p:sldId id="261" r:id="rId6"/>
+    <p:sldId id="262" r:id="rId7"/>
+    <p:sldId id="263" r:id="rId8"/>
+    <p:sldId id="264" r:id="rId9"/>
+    <p:sldId id="266" r:id="rId10"/>
+    <p:sldId id="267" r:id="rId11"/>
+    <p:sldId id="268" r:id="rId12"/>
+    <p:sldId id="265" r:id="rId13"/>
   </p:sldIdLst>
   <p:sldSz cx="12192000" cy="6858000"/>
   <p:notesSz cx="6858000" cy="9144000"/>
@@ -107,6 +115,11 @@
       </a:defRPr>
     </a:lvl9pPr>
   </p:defaultTextStyle>
+  <p:extLst>
+    <p:ext uri="{EFAFB233-063F-42B5-8137-9DF3F51BA10A}">
+      <p15:sldGuideLst xmlns:p15="http://schemas.microsoft.com/office/powerpoint/2012/main"/>
+    </p:ext>
+  </p:extLst>
 </p:presentation>
 </file>
 
@@ -241,7 +254,7 @@
           <a:p>
             <a:fld id="{D7207214-7283-490B-9BD1-7563DF0E60BF}" type="datetimeFigureOut">
               <a:rPr lang="ko-KR" altLang="en-US" smtClean="0"/>
-              <a:t>2021-03-10</a:t>
+              <a:t>2021-03-11</a:t>
             </a:fld>
             <a:endParaRPr lang="ko-KR" altLang="en-US"/>
           </a:p>
@@ -411,7 +424,7 @@
           <a:p>
             <a:fld id="{D7207214-7283-490B-9BD1-7563DF0E60BF}" type="datetimeFigureOut">
               <a:rPr lang="ko-KR" altLang="en-US" smtClean="0"/>
-              <a:t>2021-03-10</a:t>
+              <a:t>2021-03-11</a:t>
             </a:fld>
             <a:endParaRPr lang="ko-KR" altLang="en-US"/>
           </a:p>
@@ -591,7 +604,7 @@
           <a:p>
             <a:fld id="{D7207214-7283-490B-9BD1-7563DF0E60BF}" type="datetimeFigureOut">
               <a:rPr lang="ko-KR" altLang="en-US" smtClean="0"/>
-              <a:t>2021-03-10</a:t>
+              <a:t>2021-03-11</a:t>
             </a:fld>
             <a:endParaRPr lang="ko-KR" altLang="en-US"/>
           </a:p>
@@ -761,7 +774,7 @@
           <a:p>
             <a:fld id="{D7207214-7283-490B-9BD1-7563DF0E60BF}" type="datetimeFigureOut">
               <a:rPr lang="ko-KR" altLang="en-US" smtClean="0"/>
-              <a:t>2021-03-10</a:t>
+              <a:t>2021-03-11</a:t>
             </a:fld>
             <a:endParaRPr lang="ko-KR" altLang="en-US"/>
           </a:p>
@@ -1007,7 +1020,7 @@
           <a:p>
             <a:fld id="{D7207214-7283-490B-9BD1-7563DF0E60BF}" type="datetimeFigureOut">
               <a:rPr lang="ko-KR" altLang="en-US" smtClean="0"/>
-              <a:t>2021-03-10</a:t>
+              <a:t>2021-03-11</a:t>
             </a:fld>
             <a:endParaRPr lang="ko-KR" altLang="en-US"/>
           </a:p>
@@ -1239,7 +1252,7 @@
           <a:p>
             <a:fld id="{D7207214-7283-490B-9BD1-7563DF0E60BF}" type="datetimeFigureOut">
               <a:rPr lang="ko-KR" altLang="en-US" smtClean="0"/>
-              <a:t>2021-03-10</a:t>
+              <a:t>2021-03-11</a:t>
             </a:fld>
             <a:endParaRPr lang="ko-KR" altLang="en-US"/>
           </a:p>
@@ -1606,7 +1619,7 @@
           <a:p>
             <a:fld id="{D7207214-7283-490B-9BD1-7563DF0E60BF}" type="datetimeFigureOut">
               <a:rPr lang="ko-KR" altLang="en-US" smtClean="0"/>
-              <a:t>2021-03-10</a:t>
+              <a:t>2021-03-11</a:t>
             </a:fld>
             <a:endParaRPr lang="ko-KR" altLang="en-US"/>
           </a:p>
@@ -1724,7 +1737,7 @@
           <a:p>
             <a:fld id="{D7207214-7283-490B-9BD1-7563DF0E60BF}" type="datetimeFigureOut">
               <a:rPr lang="ko-KR" altLang="en-US" smtClean="0"/>
-              <a:t>2021-03-10</a:t>
+              <a:t>2021-03-11</a:t>
             </a:fld>
             <a:endParaRPr lang="ko-KR" altLang="en-US"/>
           </a:p>
@@ -1819,7 +1832,7 @@
           <a:p>
             <a:fld id="{D7207214-7283-490B-9BD1-7563DF0E60BF}" type="datetimeFigureOut">
               <a:rPr lang="ko-KR" altLang="en-US" smtClean="0"/>
-              <a:t>2021-03-10</a:t>
+              <a:t>2021-03-11</a:t>
             </a:fld>
             <a:endParaRPr lang="ko-KR" altLang="en-US"/>
           </a:p>
@@ -2096,7 +2109,7 @@
           <a:p>
             <a:fld id="{D7207214-7283-490B-9BD1-7563DF0E60BF}" type="datetimeFigureOut">
               <a:rPr lang="ko-KR" altLang="en-US" smtClean="0"/>
-              <a:t>2021-03-10</a:t>
+              <a:t>2021-03-11</a:t>
             </a:fld>
             <a:endParaRPr lang="ko-KR" altLang="en-US"/>
           </a:p>
@@ -2349,7 +2362,7 @@
           <a:p>
             <a:fld id="{D7207214-7283-490B-9BD1-7563DF0E60BF}" type="datetimeFigureOut">
               <a:rPr lang="ko-KR" altLang="en-US" smtClean="0"/>
-              <a:t>2021-03-10</a:t>
+              <a:t>2021-03-11</a:t>
             </a:fld>
             <a:endParaRPr lang="ko-KR" altLang="en-US"/>
           </a:p>
@@ -2562,7 +2575,7 @@
           <a:p>
             <a:fld id="{D7207214-7283-490B-9BD1-7563DF0E60BF}" type="datetimeFigureOut">
               <a:rPr lang="ko-KR" altLang="en-US" smtClean="0"/>
-              <a:t>2021-03-10</a:t>
+              <a:t>2021-03-11</a:t>
             </a:fld>
             <a:endParaRPr lang="ko-KR" altLang="en-US"/>
           </a:p>
@@ -3083,6 +3096,291 @@
 </p:sld>
 </file>
 
+<file path=ppt/slides/slide10.xml><?xml version="1.0" encoding="utf-8"?>
+<p:sld xmlns:a="http://schemas.openxmlformats.org/drawingml/2006/main" xmlns:r="http://schemas.openxmlformats.org/officeDocument/2006/relationships" xmlns:p="http://schemas.openxmlformats.org/presentationml/2006/main">
+  <p:cSld>
+    <p:spTree>
+      <p:nvGrpSpPr>
+        <p:cNvPr id="1" name=""/>
+        <p:cNvGrpSpPr/>
+        <p:nvPr/>
+      </p:nvGrpSpPr>
+      <p:grpSpPr>
+        <a:xfrm>
+          <a:off x="0" y="0"/>
+          <a:ext cx="0" cy="0"/>
+          <a:chOff x="0" y="0"/>
+          <a:chExt cx="0" cy="0"/>
+        </a:xfrm>
+      </p:grpSpPr>
+      <p:sp>
+        <p:nvSpPr>
+          <p:cNvPr id="2" name="제목 1"/>
+          <p:cNvSpPr>
+            <a:spLocks noGrp="1"/>
+          </p:cNvSpPr>
+          <p:nvPr>
+            <p:ph type="title"/>
+          </p:nvPr>
+        </p:nvSpPr>
+        <p:spPr/>
+        <p:txBody>
+          <a:bodyPr/>
+          <a:lstStyle/>
+          <a:p>
+            <a:r>
+              <a:rPr lang="en-US" altLang="ko-KR" dirty="0" smtClean="0"/>
+              <a:t>result</a:t>
+            </a:r>
+            <a:endParaRPr lang="ko-KR" altLang="en-US" dirty="0"/>
+          </a:p>
+        </p:txBody>
+      </p:sp>
+      <p:pic>
+        <p:nvPicPr>
+          <p:cNvPr id="5" name="그림 4"/>
+          <p:cNvPicPr>
+            <a:picLocks noChangeAspect="1"/>
+          </p:cNvPicPr>
+          <p:nvPr/>
+        </p:nvPicPr>
+        <p:blipFill>
+          <a:blip r:embed="rId2"/>
+          <a:stretch>
+            <a:fillRect/>
+          </a:stretch>
+        </p:blipFill>
+        <p:spPr>
+          <a:xfrm>
+            <a:off x="1152049" y="2184558"/>
+            <a:ext cx="9887902" cy="2867980"/>
+          </a:xfrm>
+          <a:prstGeom prst="rect">
+            <a:avLst/>
+          </a:prstGeom>
+        </p:spPr>
+      </p:pic>
+      <p:sp>
+        <p:nvSpPr>
+          <p:cNvPr id="7" name="내용 개체 틀 6"/>
+          <p:cNvSpPr>
+            <a:spLocks noGrp="1"/>
+          </p:cNvSpPr>
+          <p:nvPr>
+            <p:ph idx="1"/>
+          </p:nvPr>
+        </p:nvSpPr>
+        <p:spPr/>
+        <p:txBody>
+          <a:bodyPr/>
+          <a:lstStyle/>
+          <a:p>
+            <a:endParaRPr lang="ko-KR" altLang="en-US"/>
+          </a:p>
+        </p:txBody>
+      </p:sp>
+    </p:spTree>
+    <p:extLst>
+      <p:ext uri="{BB962C8B-B14F-4D97-AF65-F5344CB8AC3E}">
+        <p14:creationId xmlns:p14="http://schemas.microsoft.com/office/powerpoint/2010/main" val="1204773324"/>
+      </p:ext>
+    </p:extLst>
+  </p:cSld>
+  <p:clrMapOvr>
+    <a:masterClrMapping/>
+  </p:clrMapOvr>
+</p:sld>
+</file>
+
+<file path=ppt/slides/slide11.xml><?xml version="1.0" encoding="utf-8"?>
+<p:sld xmlns:a="http://schemas.openxmlformats.org/drawingml/2006/main" xmlns:r="http://schemas.openxmlformats.org/officeDocument/2006/relationships" xmlns:p="http://schemas.openxmlformats.org/presentationml/2006/main">
+  <p:cSld>
+    <p:spTree>
+      <p:nvGrpSpPr>
+        <p:cNvPr id="1" name=""/>
+        <p:cNvGrpSpPr/>
+        <p:nvPr/>
+      </p:nvGrpSpPr>
+      <p:grpSpPr>
+        <a:xfrm>
+          <a:off x="0" y="0"/>
+          <a:ext cx="0" cy="0"/>
+          <a:chOff x="0" y="0"/>
+          <a:chExt cx="0" cy="0"/>
+        </a:xfrm>
+      </p:grpSpPr>
+      <p:sp>
+        <p:nvSpPr>
+          <p:cNvPr id="2" name="제목 1"/>
+          <p:cNvSpPr>
+            <a:spLocks noGrp="1"/>
+          </p:cNvSpPr>
+          <p:nvPr>
+            <p:ph type="title"/>
+          </p:nvPr>
+        </p:nvSpPr>
+        <p:spPr/>
+        <p:txBody>
+          <a:bodyPr/>
+          <a:lstStyle/>
+          <a:p>
+            <a:r>
+              <a:rPr lang="en-US" altLang="ko-KR" dirty="0" smtClean="0"/>
+              <a:t>result</a:t>
+            </a:r>
+            <a:endParaRPr lang="ko-KR" altLang="en-US" dirty="0"/>
+          </a:p>
+        </p:txBody>
+      </p:sp>
+      <p:pic>
+        <p:nvPicPr>
+          <p:cNvPr id="4" name="내용 개체 틀 3"/>
+          <p:cNvPicPr>
+            <a:picLocks noGrp="1" noChangeAspect="1"/>
+          </p:cNvPicPr>
+          <p:nvPr>
+            <p:ph idx="1"/>
+          </p:nvPr>
+        </p:nvPicPr>
+        <p:blipFill>
+          <a:blip r:embed="rId2"/>
+          <a:stretch>
+            <a:fillRect/>
+          </a:stretch>
+        </p:blipFill>
+        <p:spPr>
+          <a:xfrm>
+            <a:off x="3654294" y="1825625"/>
+            <a:ext cx="4883411" cy="4351338"/>
+          </a:xfrm>
+          <a:prstGeom prst="rect">
+            <a:avLst/>
+          </a:prstGeom>
+        </p:spPr>
+      </p:pic>
+    </p:spTree>
+    <p:extLst>
+      <p:ext uri="{BB962C8B-B14F-4D97-AF65-F5344CB8AC3E}">
+        <p14:creationId xmlns:p14="http://schemas.microsoft.com/office/powerpoint/2010/main" val="3231002063"/>
+      </p:ext>
+    </p:extLst>
+  </p:cSld>
+  <p:clrMapOvr>
+    <a:masterClrMapping/>
+  </p:clrMapOvr>
+</p:sld>
+</file>
+
+<file path=ppt/slides/slide12.xml><?xml version="1.0" encoding="utf-8"?>
+<p:sld xmlns:a="http://schemas.openxmlformats.org/drawingml/2006/main" xmlns:r="http://schemas.openxmlformats.org/officeDocument/2006/relationships" xmlns:p="http://schemas.openxmlformats.org/presentationml/2006/main">
+  <p:cSld>
+    <p:spTree>
+      <p:nvGrpSpPr>
+        <p:cNvPr id="1" name=""/>
+        <p:cNvGrpSpPr/>
+        <p:nvPr/>
+      </p:nvGrpSpPr>
+      <p:grpSpPr>
+        <a:xfrm>
+          <a:off x="0" y="0"/>
+          <a:ext cx="0" cy="0"/>
+          <a:chOff x="0" y="0"/>
+          <a:chExt cx="0" cy="0"/>
+        </a:xfrm>
+      </p:grpSpPr>
+      <p:sp>
+        <p:nvSpPr>
+          <p:cNvPr id="2" name="제목 1"/>
+          <p:cNvSpPr>
+            <a:spLocks noGrp="1"/>
+          </p:cNvSpPr>
+          <p:nvPr>
+            <p:ph type="title"/>
+          </p:nvPr>
+        </p:nvSpPr>
+        <p:spPr/>
+        <p:txBody>
+          <a:bodyPr/>
+          <a:lstStyle/>
+          <a:p>
+            <a:r>
+              <a:rPr lang="en-US" altLang="ko-KR" dirty="0" smtClean="0"/>
+              <a:t>result</a:t>
+            </a:r>
+            <a:endParaRPr lang="ko-KR" altLang="en-US" dirty="0"/>
+          </a:p>
+        </p:txBody>
+      </p:sp>
+      <p:sp>
+        <p:nvSpPr>
+          <p:cNvPr id="3" name="내용 개체 틀 2"/>
+          <p:cNvSpPr>
+            <a:spLocks noGrp="1"/>
+          </p:cNvSpPr>
+          <p:nvPr>
+            <p:ph idx="1"/>
+          </p:nvPr>
+        </p:nvSpPr>
+        <p:spPr/>
+        <p:txBody>
+          <a:bodyPr/>
+          <a:lstStyle/>
+          <a:p>
+            <a:r>
+              <a:rPr lang="en-US" altLang="ko-KR" dirty="0" smtClean="0"/>
+              <a:t>Better than </a:t>
+            </a:r>
+            <a:r>
+              <a:rPr lang="en-US" altLang="ko-KR" dirty="0" err="1" smtClean="0"/>
+              <a:t>sota</a:t>
+            </a:r>
+            <a:r>
+              <a:rPr lang="en-US" altLang="ko-KR" dirty="0" smtClean="0"/>
+              <a:t>(</a:t>
+            </a:r>
+            <a:r>
+              <a:rPr lang="en-US" altLang="ko-KR" dirty="0" err="1" smtClean="0"/>
+              <a:t>Unet</a:t>
+            </a:r>
+            <a:r>
+              <a:rPr lang="en-US" altLang="ko-KR" dirty="0" smtClean="0"/>
+              <a:t>++)</a:t>
+            </a:r>
+          </a:p>
+          <a:p>
+            <a:r>
+              <a:rPr lang="en-US" altLang="ko-KR" dirty="0" smtClean="0"/>
+              <a:t>Very good performance with a fewer labeled data</a:t>
+            </a:r>
+          </a:p>
+          <a:p>
+            <a:r>
+              <a:rPr lang="en-US" altLang="ko-KR" dirty="0" smtClean="0"/>
+              <a:t>No Convolution</a:t>
+            </a:r>
+          </a:p>
+          <a:p>
+            <a:r>
+              <a:rPr lang="en-US" altLang="ko-KR" dirty="0" smtClean="0"/>
+              <a:t>Attention used</a:t>
+            </a:r>
+            <a:endParaRPr lang="ko-KR" altLang="en-US" dirty="0"/>
+          </a:p>
+        </p:txBody>
+      </p:sp>
+    </p:spTree>
+    <p:extLst>
+      <p:ext uri="{BB962C8B-B14F-4D97-AF65-F5344CB8AC3E}">
+        <p14:creationId xmlns:p14="http://schemas.microsoft.com/office/powerpoint/2010/main" val="2205054019"/>
+      </p:ext>
+    </p:extLst>
+  </p:cSld>
+  <p:clrMapOvr>
+    <a:masterClrMapping/>
+  </p:clrMapOvr>
+</p:sld>
+</file>
+
 <file path=ppt/slides/slide2.xml><?xml version="1.0" encoding="utf-8"?>
 <p:sld xmlns:a="http://schemas.openxmlformats.org/drawingml/2006/main" xmlns:r="http://schemas.openxmlformats.org/officeDocument/2006/relationships" xmlns:p="http://schemas.openxmlformats.org/presentationml/2006/main">
   <p:cSld>
@@ -4769,6 +5067,600 @@
       </p:par>
     </p:tnLst>
   </p:timing>
+</p:sld>
+</file>
+
+<file path=ppt/slides/slide5.xml><?xml version="1.0" encoding="utf-8"?>
+<p:sld xmlns:a="http://schemas.openxmlformats.org/drawingml/2006/main" xmlns:r="http://schemas.openxmlformats.org/officeDocument/2006/relationships" xmlns:p="http://schemas.openxmlformats.org/presentationml/2006/main">
+  <p:cSld>
+    <p:spTree>
+      <p:nvGrpSpPr>
+        <p:cNvPr id="1" name=""/>
+        <p:cNvGrpSpPr/>
+        <p:nvPr/>
+      </p:nvGrpSpPr>
+      <p:grpSpPr>
+        <a:xfrm>
+          <a:off x="0" y="0"/>
+          <a:ext cx="0" cy="0"/>
+          <a:chOff x="0" y="0"/>
+          <a:chExt cx="0" cy="0"/>
+        </a:xfrm>
+      </p:grpSpPr>
+      <p:sp>
+        <p:nvSpPr>
+          <p:cNvPr id="2" name="제목 1"/>
+          <p:cNvSpPr>
+            <a:spLocks noGrp="1"/>
+          </p:cNvSpPr>
+          <p:nvPr>
+            <p:ph type="title"/>
+          </p:nvPr>
+        </p:nvSpPr>
+        <p:spPr/>
+        <p:txBody>
+          <a:bodyPr/>
+          <a:lstStyle/>
+          <a:p>
+            <a:r>
+              <a:rPr lang="en-US" altLang="ko-KR" dirty="0" smtClean="0"/>
+              <a:t>model</a:t>
+            </a:r>
+            <a:endParaRPr lang="ko-KR" altLang="en-US" dirty="0"/>
+          </a:p>
+        </p:txBody>
+      </p:sp>
+      <p:pic>
+        <p:nvPicPr>
+          <p:cNvPr id="10" name="내용 개체 틀 9"/>
+          <p:cNvPicPr>
+            <a:picLocks noGrp="1" noChangeAspect="1"/>
+          </p:cNvPicPr>
+          <p:nvPr>
+            <p:ph idx="1"/>
+          </p:nvPr>
+        </p:nvPicPr>
+        <p:blipFill>
+          <a:blip r:embed="rId2"/>
+          <a:stretch>
+            <a:fillRect/>
+          </a:stretch>
+        </p:blipFill>
+        <p:spPr>
+          <a:xfrm>
+            <a:off x="838200" y="3641117"/>
+            <a:ext cx="10515600" cy="2116666"/>
+          </a:xfrm>
+          <a:prstGeom prst="rect">
+            <a:avLst/>
+          </a:prstGeom>
+        </p:spPr>
+      </p:pic>
+      <p:pic>
+        <p:nvPicPr>
+          <p:cNvPr id="5" name="그림 4"/>
+          <p:cNvPicPr>
+            <a:picLocks noChangeAspect="1"/>
+          </p:cNvPicPr>
+          <p:nvPr/>
+        </p:nvPicPr>
+        <p:blipFill>
+          <a:blip r:embed="rId3"/>
+          <a:stretch>
+            <a:fillRect/>
+          </a:stretch>
+        </p:blipFill>
+        <p:spPr>
+          <a:xfrm>
+            <a:off x="8096075" y="307245"/>
+            <a:ext cx="4095925" cy="3183539"/>
+          </a:xfrm>
+          <a:prstGeom prst="rect">
+            <a:avLst/>
+          </a:prstGeom>
+        </p:spPr>
+      </p:pic>
+    </p:spTree>
+    <p:extLst>
+      <p:ext uri="{BB962C8B-B14F-4D97-AF65-F5344CB8AC3E}">
+        <p14:creationId xmlns:p14="http://schemas.microsoft.com/office/powerpoint/2010/main" val="103008444"/>
+      </p:ext>
+    </p:extLst>
+  </p:cSld>
+  <p:clrMapOvr>
+    <a:masterClrMapping/>
+  </p:clrMapOvr>
+</p:sld>
+</file>
+
+<file path=ppt/slides/slide6.xml><?xml version="1.0" encoding="utf-8"?>
+<p:sld xmlns:a="http://schemas.openxmlformats.org/drawingml/2006/main" xmlns:r="http://schemas.openxmlformats.org/officeDocument/2006/relationships" xmlns:p="http://schemas.openxmlformats.org/presentationml/2006/main">
+  <p:cSld>
+    <p:spTree>
+      <p:nvGrpSpPr>
+        <p:cNvPr id="1" name=""/>
+        <p:cNvGrpSpPr/>
+        <p:nvPr/>
+      </p:nvGrpSpPr>
+      <p:grpSpPr>
+        <a:xfrm>
+          <a:off x="0" y="0"/>
+          <a:ext cx="0" cy="0"/>
+          <a:chOff x="0" y="0"/>
+          <a:chExt cx="0" cy="0"/>
+        </a:xfrm>
+      </p:grpSpPr>
+      <p:sp>
+        <p:nvSpPr>
+          <p:cNvPr id="2" name="제목 1"/>
+          <p:cNvSpPr>
+            <a:spLocks noGrp="1"/>
+          </p:cNvSpPr>
+          <p:nvPr>
+            <p:ph type="title"/>
+          </p:nvPr>
+        </p:nvSpPr>
+        <p:spPr/>
+        <p:txBody>
+          <a:bodyPr/>
+          <a:lstStyle/>
+          <a:p>
+            <a:r>
+              <a:rPr lang="en-US" altLang="ko-KR" dirty="0" smtClean="0"/>
+              <a:t>model</a:t>
+            </a:r>
+            <a:endParaRPr lang="ko-KR" altLang="en-US" dirty="0"/>
+          </a:p>
+        </p:txBody>
+      </p:sp>
+      <p:sp>
+        <p:nvSpPr>
+          <p:cNvPr id="3" name="내용 개체 틀 2"/>
+          <p:cNvSpPr>
+            <a:spLocks noGrp="1"/>
+          </p:cNvSpPr>
+          <p:nvPr>
+            <p:ph idx="1"/>
+          </p:nvPr>
+        </p:nvSpPr>
+        <p:spPr/>
+        <p:txBody>
+          <a:bodyPr/>
+          <a:lstStyle/>
+          <a:p>
+            <a:pPr marL="0" indent="0">
+              <a:buNone/>
+            </a:pPr>
+            <a:endParaRPr lang="ko-KR" altLang="en-US" dirty="0"/>
+          </a:p>
+        </p:txBody>
+      </p:sp>
+      <p:pic>
+        <p:nvPicPr>
+          <p:cNvPr id="4" name="그림 3"/>
+          <p:cNvPicPr>
+            <a:picLocks noChangeAspect="1"/>
+          </p:cNvPicPr>
+          <p:nvPr/>
+        </p:nvPicPr>
+        <p:blipFill>
+          <a:blip r:embed="rId2"/>
+          <a:stretch>
+            <a:fillRect/>
+          </a:stretch>
+        </p:blipFill>
+        <p:spPr>
+          <a:xfrm>
+            <a:off x="229371" y="2330771"/>
+            <a:ext cx="8766347" cy="3004771"/>
+          </a:xfrm>
+          <a:prstGeom prst="rect">
+            <a:avLst/>
+          </a:prstGeom>
+        </p:spPr>
+      </p:pic>
+      <p:pic>
+        <p:nvPicPr>
+          <p:cNvPr id="5" name="그림 4"/>
+          <p:cNvPicPr>
+            <a:picLocks noChangeAspect="1"/>
+          </p:cNvPicPr>
+          <p:nvPr/>
+        </p:nvPicPr>
+        <p:blipFill>
+          <a:blip r:embed="rId3"/>
+          <a:stretch>
+            <a:fillRect/>
+          </a:stretch>
+        </p:blipFill>
+        <p:spPr>
+          <a:xfrm>
+            <a:off x="9288548" y="1119188"/>
+            <a:ext cx="2524125" cy="5057775"/>
+          </a:xfrm>
+          <a:prstGeom prst="rect">
+            <a:avLst/>
+          </a:prstGeom>
+        </p:spPr>
+      </p:pic>
+    </p:spTree>
+    <p:extLst>
+      <p:ext uri="{BB962C8B-B14F-4D97-AF65-F5344CB8AC3E}">
+        <p14:creationId xmlns:p14="http://schemas.microsoft.com/office/powerpoint/2010/main" val="2271759718"/>
+      </p:ext>
+    </p:extLst>
+  </p:cSld>
+  <p:clrMapOvr>
+    <a:masterClrMapping/>
+  </p:clrMapOvr>
+</p:sld>
+</file>
+
+<file path=ppt/slides/slide7.xml><?xml version="1.0" encoding="utf-8"?>
+<p:sld xmlns:a="http://schemas.openxmlformats.org/drawingml/2006/main" xmlns:r="http://schemas.openxmlformats.org/officeDocument/2006/relationships" xmlns:p="http://schemas.openxmlformats.org/presentationml/2006/main">
+  <p:cSld>
+    <p:spTree>
+      <p:nvGrpSpPr>
+        <p:cNvPr id="1" name=""/>
+        <p:cNvGrpSpPr/>
+        <p:nvPr/>
+      </p:nvGrpSpPr>
+      <p:grpSpPr>
+        <a:xfrm>
+          <a:off x="0" y="0"/>
+          <a:ext cx="0" cy="0"/>
+          <a:chOff x="0" y="0"/>
+          <a:chExt cx="0" cy="0"/>
+        </a:xfrm>
+      </p:grpSpPr>
+      <p:sp>
+        <p:nvSpPr>
+          <p:cNvPr id="2" name="제목 1"/>
+          <p:cNvSpPr>
+            <a:spLocks noGrp="1"/>
+          </p:cNvSpPr>
+          <p:nvPr>
+            <p:ph type="title"/>
+          </p:nvPr>
+        </p:nvSpPr>
+        <p:spPr/>
+        <p:txBody>
+          <a:bodyPr/>
+          <a:lstStyle/>
+          <a:p>
+            <a:r>
+              <a:rPr lang="en-US" altLang="ko-KR" dirty="0"/>
+              <a:t>m</a:t>
+            </a:r>
+            <a:r>
+              <a:rPr lang="en-US" altLang="ko-KR" dirty="0" smtClean="0"/>
+              <a:t>odel, loss</a:t>
+            </a:r>
+            <a:endParaRPr lang="ko-KR" altLang="en-US" dirty="0"/>
+          </a:p>
+        </p:txBody>
+      </p:sp>
+      <p:pic>
+        <p:nvPicPr>
+          <p:cNvPr id="5" name="내용 개체 틀 4"/>
+          <p:cNvPicPr>
+            <a:picLocks noGrp="1" noChangeAspect="1"/>
+          </p:cNvPicPr>
+          <p:nvPr>
+            <p:ph idx="1"/>
+          </p:nvPr>
+        </p:nvPicPr>
+        <p:blipFill>
+          <a:blip r:embed="rId2"/>
+          <a:stretch>
+            <a:fillRect/>
+          </a:stretch>
+        </p:blipFill>
+        <p:spPr>
+          <a:xfrm>
+            <a:off x="1555921" y="1869367"/>
+            <a:ext cx="3581400" cy="781050"/>
+          </a:xfrm>
+          <a:prstGeom prst="rect">
+            <a:avLst/>
+          </a:prstGeom>
+        </p:spPr>
+      </p:pic>
+      <p:pic>
+        <p:nvPicPr>
+          <p:cNvPr id="4" name="그림 3"/>
+          <p:cNvPicPr>
+            <a:picLocks noChangeAspect="1"/>
+          </p:cNvPicPr>
+          <p:nvPr/>
+        </p:nvPicPr>
+        <p:blipFill>
+          <a:blip r:embed="rId3"/>
+          <a:stretch>
+            <a:fillRect/>
+          </a:stretch>
+        </p:blipFill>
+        <p:spPr>
+          <a:xfrm>
+            <a:off x="6160487" y="437270"/>
+            <a:ext cx="4257675" cy="2333625"/>
+          </a:xfrm>
+          <a:prstGeom prst="rect">
+            <a:avLst/>
+          </a:prstGeom>
+        </p:spPr>
+      </p:pic>
+      <p:pic>
+        <p:nvPicPr>
+          <p:cNvPr id="6" name="그림 5"/>
+          <p:cNvPicPr>
+            <a:picLocks noChangeAspect="1"/>
+          </p:cNvPicPr>
+          <p:nvPr/>
+        </p:nvPicPr>
+        <p:blipFill>
+          <a:blip r:embed="rId4"/>
+          <a:stretch>
+            <a:fillRect/>
+          </a:stretch>
+        </p:blipFill>
+        <p:spPr>
+          <a:xfrm>
+            <a:off x="3709986" y="3897784"/>
+            <a:ext cx="4772025" cy="2114550"/>
+          </a:xfrm>
+          <a:prstGeom prst="rect">
+            <a:avLst/>
+          </a:prstGeom>
+        </p:spPr>
+      </p:pic>
+      <p:sp>
+        <p:nvSpPr>
+          <p:cNvPr id="7" name="TextBox 6"/>
+          <p:cNvSpPr txBox="1"/>
+          <p:nvPr/>
+        </p:nvSpPr>
+        <p:spPr>
+          <a:xfrm>
+            <a:off x="2629185" y="3423506"/>
+            <a:ext cx="6933629" cy="369332"/>
+          </a:xfrm>
+          <a:prstGeom prst="rect">
+            <a:avLst/>
+          </a:prstGeom>
+          <a:noFill/>
+        </p:spPr>
+        <p:txBody>
+          <a:bodyPr wrap="none" rtlCol="0">
+            <a:spAutoFit/>
+          </a:bodyPr>
+          <a:lstStyle/>
+          <a:p>
+            <a:r>
+              <a:rPr lang="en-US" altLang="ko-KR" dirty="0" smtClean="0"/>
+              <a:t>Maximize dice similarity coefficient between Y and ground truth</a:t>
+            </a:r>
+            <a:endParaRPr lang="ko-KR" altLang="en-US" dirty="0"/>
+          </a:p>
+        </p:txBody>
+      </p:sp>
+    </p:spTree>
+    <p:extLst>
+      <p:ext uri="{BB962C8B-B14F-4D97-AF65-F5344CB8AC3E}">
+        <p14:creationId xmlns:p14="http://schemas.microsoft.com/office/powerpoint/2010/main" val="3748545548"/>
+      </p:ext>
+    </p:extLst>
+  </p:cSld>
+  <p:clrMapOvr>
+    <a:masterClrMapping/>
+  </p:clrMapOvr>
+</p:sld>
+</file>
+
+<file path=ppt/slides/slide8.xml><?xml version="1.0" encoding="utf-8"?>
+<p:sld xmlns:a="http://schemas.openxmlformats.org/drawingml/2006/main" xmlns:r="http://schemas.openxmlformats.org/officeDocument/2006/relationships" xmlns:p="http://schemas.openxmlformats.org/presentationml/2006/main">
+  <p:cSld>
+    <p:spTree>
+      <p:nvGrpSpPr>
+        <p:cNvPr id="1" name=""/>
+        <p:cNvGrpSpPr/>
+        <p:nvPr/>
+      </p:nvGrpSpPr>
+      <p:grpSpPr>
+        <a:xfrm>
+          <a:off x="0" y="0"/>
+          <a:ext cx="0" cy="0"/>
+          <a:chOff x="0" y="0"/>
+          <a:chExt cx="0" cy="0"/>
+        </a:xfrm>
+      </p:grpSpPr>
+      <p:sp>
+        <p:nvSpPr>
+          <p:cNvPr id="2" name="제목 1"/>
+          <p:cNvSpPr>
+            <a:spLocks noGrp="1"/>
+          </p:cNvSpPr>
+          <p:nvPr>
+            <p:ph type="title"/>
+          </p:nvPr>
+        </p:nvSpPr>
+        <p:spPr/>
+        <p:txBody>
+          <a:bodyPr/>
+          <a:lstStyle/>
+          <a:p>
+            <a:r>
+              <a:rPr lang="en-US" altLang="ko-KR" dirty="0" smtClean="0"/>
+              <a:t>train</a:t>
+            </a:r>
+            <a:endParaRPr lang="ko-KR" altLang="en-US" dirty="0"/>
+          </a:p>
+        </p:txBody>
+      </p:sp>
+      <p:sp>
+        <p:nvSpPr>
+          <p:cNvPr id="3" name="내용 개체 틀 2"/>
+          <p:cNvSpPr>
+            <a:spLocks noGrp="1"/>
+          </p:cNvSpPr>
+          <p:nvPr>
+            <p:ph idx="1"/>
+          </p:nvPr>
+        </p:nvSpPr>
+        <p:spPr/>
+        <p:txBody>
+          <a:bodyPr/>
+          <a:lstStyle/>
+          <a:p>
+            <a:r>
+              <a:rPr lang="en-US" altLang="ko-KR" dirty="0" smtClean="0"/>
+              <a:t>Pre-train with unlabeled data for </a:t>
+            </a:r>
+            <a:r>
+              <a:rPr lang="en-US" altLang="ko-KR" dirty="0" err="1" smtClean="0"/>
+              <a:t>denoising</a:t>
+            </a:r>
+            <a:r>
+              <a:rPr lang="en-US" altLang="ko-KR" dirty="0" smtClean="0"/>
+              <a:t> or </a:t>
+            </a:r>
+            <a:r>
+              <a:rPr lang="en-US" altLang="ko-KR" dirty="0" err="1" smtClean="0"/>
+              <a:t>inpainting</a:t>
+            </a:r>
+            <a:r>
+              <a:rPr lang="en-US" altLang="ko-KR" dirty="0" smtClean="0"/>
+              <a:t> tasks</a:t>
+            </a:r>
+          </a:p>
+          <a:p>
+            <a:r>
+              <a:rPr lang="en-US" altLang="ko-KR" dirty="0" smtClean="0"/>
+              <a:t>Used L2 Norm when pre-train</a:t>
+            </a:r>
+          </a:p>
+          <a:p>
+            <a:r>
+              <a:rPr lang="en-US" altLang="ko-KR" dirty="0" smtClean="0"/>
+              <a:t>Fine tune with DSC</a:t>
+            </a:r>
+            <a:endParaRPr lang="ko-KR" altLang="en-US" dirty="0"/>
+          </a:p>
+        </p:txBody>
+      </p:sp>
+    </p:spTree>
+    <p:extLst>
+      <p:ext uri="{BB962C8B-B14F-4D97-AF65-F5344CB8AC3E}">
+        <p14:creationId xmlns:p14="http://schemas.microsoft.com/office/powerpoint/2010/main" val="2452024384"/>
+      </p:ext>
+    </p:extLst>
+  </p:cSld>
+  <p:clrMapOvr>
+    <a:masterClrMapping/>
+  </p:clrMapOvr>
+</p:sld>
+</file>
+
+<file path=ppt/slides/slide9.xml><?xml version="1.0" encoding="utf-8"?>
+<p:sld xmlns:a="http://schemas.openxmlformats.org/drawingml/2006/main" xmlns:r="http://schemas.openxmlformats.org/officeDocument/2006/relationships" xmlns:p="http://schemas.openxmlformats.org/presentationml/2006/main">
+  <p:cSld>
+    <p:spTree>
+      <p:nvGrpSpPr>
+        <p:cNvPr id="1" name=""/>
+        <p:cNvGrpSpPr/>
+        <p:nvPr/>
+      </p:nvGrpSpPr>
+      <p:grpSpPr>
+        <a:xfrm>
+          <a:off x="0" y="0"/>
+          <a:ext cx="0" cy="0"/>
+          <a:chOff x="0" y="0"/>
+          <a:chExt cx="0" cy="0"/>
+        </a:xfrm>
+      </p:grpSpPr>
+      <p:sp>
+        <p:nvSpPr>
+          <p:cNvPr id="2" name="제목 1"/>
+          <p:cNvSpPr>
+            <a:spLocks noGrp="1"/>
+          </p:cNvSpPr>
+          <p:nvPr>
+            <p:ph type="title"/>
+          </p:nvPr>
+        </p:nvSpPr>
+        <p:spPr/>
+        <p:txBody>
+          <a:bodyPr/>
+          <a:lstStyle/>
+          <a:p>
+            <a:r>
+              <a:rPr lang="en-US" altLang="ko-KR" dirty="0" smtClean="0"/>
+              <a:t>result</a:t>
+            </a:r>
+            <a:endParaRPr lang="ko-KR" altLang="en-US" dirty="0"/>
+          </a:p>
+        </p:txBody>
+      </p:sp>
+      <p:pic>
+        <p:nvPicPr>
+          <p:cNvPr id="5" name="그림 4"/>
+          <p:cNvPicPr>
+            <a:picLocks noChangeAspect="1"/>
+          </p:cNvPicPr>
+          <p:nvPr/>
+        </p:nvPicPr>
+        <p:blipFill>
+          <a:blip r:embed="rId2"/>
+          <a:stretch>
+            <a:fillRect/>
+          </a:stretch>
+        </p:blipFill>
+        <p:spPr>
+          <a:xfrm>
+            <a:off x="5438613" y="1988383"/>
+            <a:ext cx="6055649" cy="3513772"/>
+          </a:xfrm>
+          <a:prstGeom prst="rect">
+            <a:avLst/>
+          </a:prstGeom>
+        </p:spPr>
+      </p:pic>
+      <p:pic>
+        <p:nvPicPr>
+          <p:cNvPr id="4" name="내용 개체 틀 3"/>
+          <p:cNvPicPr>
+            <a:picLocks noGrp="1" noChangeAspect="1"/>
+          </p:cNvPicPr>
+          <p:nvPr>
+            <p:ph idx="1"/>
+          </p:nvPr>
+        </p:nvPicPr>
+        <p:blipFill>
+          <a:blip r:embed="rId3"/>
+          <a:stretch>
+            <a:fillRect/>
+          </a:stretch>
+        </p:blipFill>
+        <p:spPr>
+          <a:xfrm>
+            <a:off x="1036320" y="1772886"/>
+            <a:ext cx="3707194" cy="3944765"/>
+          </a:xfrm>
+          <a:prstGeom prst="rect">
+            <a:avLst/>
+          </a:prstGeom>
+        </p:spPr>
+      </p:pic>
+    </p:spTree>
+    <p:extLst>
+      <p:ext uri="{BB962C8B-B14F-4D97-AF65-F5344CB8AC3E}">
+        <p14:creationId xmlns:p14="http://schemas.microsoft.com/office/powerpoint/2010/main" val="3640262457"/>
+      </p:ext>
+    </p:extLst>
+  </p:cSld>
+  <p:clrMapOvr>
+    <a:masterClrMapping/>
+  </p:clrMapOvr>
 </p:sld>
 </file>
 

</xml_diff>